<commit_message>
Actually removed GoalsAndUserManual and actually changed the referat
</commit_message>
<xml_diff>
--- a/Dokumenter/Presentation/Gruppepresentasjon.pptx
+++ b/Dokumenter/Presentation/Gruppepresentasjon.pptx
@@ -1586,7 +1586,21 @@
                 </a:uFill>
                 <a:latin typeface="Arial"/>
               </a:rPr>
-              <a:t>Click to edit the outline text format</a:t>
+              <a:t>Click to edit the </a:t>
+            </a:r>
+            <a:r>
+              <a:rPr b="0" lang="en-US" sz="3200" spc="-1" strike="noStrike">
+                <a:solidFill>
+                  <a:srgbClr val="000000"/>
+                </a:solidFill>
+                <a:uFill>
+                  <a:solidFill>
+                    <a:srgbClr val="ffffff"/>
+                  </a:solidFill>
+                </a:uFill>
+                <a:latin typeface="Arial"/>
+              </a:rPr>
+              <a:t>outline text format</a:t>
             </a:r>
             <a:endParaRPr b="0" lang="en-US" sz="3200" spc="-1" strike="noStrike">
               <a:solidFill>
@@ -1621,7 +1635,21 @@
                 </a:uFill>
                 <a:latin typeface="Arial"/>
               </a:rPr>
-              <a:t>Second Outline Level</a:t>
+              <a:t>Second Outline </a:t>
+            </a:r>
+            <a:r>
+              <a:rPr b="0" lang="en-US" sz="2800" spc="-1" strike="noStrike">
+                <a:solidFill>
+                  <a:srgbClr val="000000"/>
+                </a:solidFill>
+                <a:uFill>
+                  <a:solidFill>
+                    <a:srgbClr val="ffffff"/>
+                  </a:solidFill>
+                </a:uFill>
+                <a:latin typeface="Arial"/>
+              </a:rPr>
+              <a:t>Level</a:t>
             </a:r>
             <a:endParaRPr b="0" lang="en-US" sz="2800" spc="-1" strike="noStrike">
               <a:solidFill>
@@ -1656,7 +1684,21 @@
                 </a:uFill>
                 <a:latin typeface="Arial"/>
               </a:rPr>
-              <a:t>Third Outline Level</a:t>
+              <a:t>Third Outline </a:t>
+            </a:r>
+            <a:r>
+              <a:rPr b="0" lang="en-US" sz="2400" spc="-1" strike="noStrike">
+                <a:solidFill>
+                  <a:srgbClr val="000000"/>
+                </a:solidFill>
+                <a:uFill>
+                  <a:solidFill>
+                    <a:srgbClr val="ffffff"/>
+                  </a:solidFill>
+                </a:uFill>
+                <a:latin typeface="Arial"/>
+              </a:rPr>
+              <a:t>Level</a:t>
             </a:r>
             <a:endParaRPr b="0" lang="en-US" sz="2400" spc="-1" strike="noStrike">
               <a:solidFill>
@@ -1691,7 +1733,21 @@
                 </a:uFill>
                 <a:latin typeface="Arial"/>
               </a:rPr>
-              <a:t>Fourth Outline Level</a:t>
+              <a:t>Fourth Outline </a:t>
+            </a:r>
+            <a:r>
+              <a:rPr b="0" lang="en-US" sz="2000" spc="-1" strike="noStrike">
+                <a:solidFill>
+                  <a:srgbClr val="000000"/>
+                </a:solidFill>
+                <a:uFill>
+                  <a:solidFill>
+                    <a:srgbClr val="ffffff"/>
+                  </a:solidFill>
+                </a:uFill>
+                <a:latin typeface="Arial"/>
+              </a:rPr>
+              <a:t>Level</a:t>
             </a:r>
             <a:endParaRPr b="0" lang="en-US" sz="2000" spc="-1" strike="noStrike">
               <a:solidFill>
@@ -1726,7 +1782,21 @@
                 </a:uFill>
                 <a:latin typeface="Arial"/>
               </a:rPr>
-              <a:t>Fifth Outline Level</a:t>
+              <a:t>Fifth Outline </a:t>
+            </a:r>
+            <a:r>
+              <a:rPr b="0" lang="en-US" sz="2000" spc="-1" strike="noStrike">
+                <a:solidFill>
+                  <a:srgbClr val="000000"/>
+                </a:solidFill>
+                <a:uFill>
+                  <a:solidFill>
+                    <a:srgbClr val="ffffff"/>
+                  </a:solidFill>
+                </a:uFill>
+                <a:latin typeface="Arial"/>
+              </a:rPr>
+              <a:t>Level</a:t>
             </a:r>
             <a:endParaRPr b="0" lang="en-US" sz="2000" spc="-1" strike="noStrike">
               <a:solidFill>
@@ -1761,7 +1831,35 @@
                 </a:uFill>
                 <a:latin typeface="Arial"/>
               </a:rPr>
-              <a:t>Sixth Outline Level</a:t>
+              <a:t>Sixth </a:t>
+            </a:r>
+            <a:r>
+              <a:rPr b="0" lang="en-US" sz="2000" spc="-1" strike="noStrike">
+                <a:solidFill>
+                  <a:srgbClr val="000000"/>
+                </a:solidFill>
+                <a:uFill>
+                  <a:solidFill>
+                    <a:srgbClr val="ffffff"/>
+                  </a:solidFill>
+                </a:uFill>
+                <a:latin typeface="Arial"/>
+              </a:rPr>
+              <a:t>Outline </a:t>
+            </a:r>
+            <a:r>
+              <a:rPr b="0" lang="en-US" sz="2000" spc="-1" strike="noStrike">
+                <a:solidFill>
+                  <a:srgbClr val="000000"/>
+                </a:solidFill>
+                <a:uFill>
+                  <a:solidFill>
+                    <a:srgbClr val="ffffff"/>
+                  </a:solidFill>
+                </a:uFill>
+                <a:latin typeface="Arial"/>
+              </a:rPr>
+              <a:t>Level</a:t>
             </a:r>
             <a:endParaRPr b="0" lang="en-US" sz="2000" spc="-1" strike="noStrike">
               <a:solidFill>
@@ -1796,7 +1894,63 @@
                 </a:uFill>
                 <a:latin typeface="Arial"/>
               </a:rPr>
-              <a:t>Seventh Outline Level</a:t>
+              <a:t>Seven</a:t>
+            </a:r>
+            <a:r>
+              <a:rPr b="0" lang="en-US" sz="2000" spc="-1" strike="noStrike">
+                <a:solidFill>
+                  <a:srgbClr val="000000"/>
+                </a:solidFill>
+                <a:uFill>
+                  <a:solidFill>
+                    <a:srgbClr val="ffffff"/>
+                  </a:solidFill>
+                </a:uFill>
+                <a:latin typeface="Arial"/>
+              </a:rPr>
+              <a:t>th </a:t>
+            </a:r>
+            <a:r>
+              <a:rPr b="0" lang="en-US" sz="2000" spc="-1" strike="noStrike">
+                <a:solidFill>
+                  <a:srgbClr val="000000"/>
+                </a:solidFill>
+                <a:uFill>
+                  <a:solidFill>
+                    <a:srgbClr val="ffffff"/>
+                  </a:solidFill>
+                </a:uFill>
+                <a:latin typeface="Arial"/>
+              </a:rPr>
+              <a:t>Outlin</a:t>
+            </a:r>
+            <a:r>
+              <a:rPr b="0" lang="en-US" sz="2000" spc="-1" strike="noStrike">
+                <a:solidFill>
+                  <a:srgbClr val="000000"/>
+                </a:solidFill>
+                <a:uFill>
+                  <a:solidFill>
+                    <a:srgbClr val="ffffff"/>
+                  </a:solidFill>
+                </a:uFill>
+                <a:latin typeface="Arial"/>
+              </a:rPr>
+              <a:t>e </a:t>
+            </a:r>
+            <a:r>
+              <a:rPr b="0" lang="en-US" sz="2000" spc="-1" strike="noStrike">
+                <a:solidFill>
+                  <a:srgbClr val="000000"/>
+                </a:solidFill>
+                <a:uFill>
+                  <a:solidFill>
+                    <a:srgbClr val="ffffff"/>
+                  </a:solidFill>
+                </a:uFill>
+                <a:latin typeface="Arial"/>
+              </a:rPr>
+              <a:t>Level</a:t>
             </a:r>
             <a:endParaRPr b="0" lang="en-US" sz="2000" spc="-1" strike="noStrike">
               <a:solidFill>

</xml_diff>